<commit_message>
I am tired help!!!! PPTX
</commit_message>
<xml_diff>
--- a/others/TicTacX.pptx
+++ b/others/TicTacX.pptx
@@ -157,7 +157,7 @@
 <file path=ppt/revisionInfo.xml><?xml version="1.0" encoding="utf-8"?>
 <p1510:revInfo xmlns:a="http://schemas.openxmlformats.org/drawingml/2006/main" xmlns:r="http://schemas.openxmlformats.org/officeDocument/2006/relationships" xmlns:p1510="http://schemas.microsoft.com/office/powerpoint/2015/10/main">
   <p1510:revLst>
-    <p1510:client id="{CEA78450-4F91-469D-B8F2-4266BBE6DA38}" v="42" dt="2025-08-12T20:25:44.401"/>
+    <p1510:client id="{CEA78450-4F91-469D-B8F2-4266BBE6DA38}" v="77" dt="2025-08-12T20:42:24.871"/>
   </p1510:revLst>
 </p1510:revInfo>
 </file>
@@ -167,7 +167,7 @@
   <pc:docChgLst>
     <pc:chgData name="Md Ishrak Mashroor" userId="e451b154c326eb62" providerId="LiveId" clId="{CEA78450-4F91-469D-B8F2-4266BBE6DA38}"/>
     <pc:docChg chg="undo custSel modSld sldOrd modMainMaster">
-      <pc:chgData name="Md Ishrak Mashroor" userId="e451b154c326eb62" providerId="LiveId" clId="{CEA78450-4F91-469D-B8F2-4266BBE6DA38}" dt="2025-08-12T20:25:40.057" v="933" actId="14100"/>
+      <pc:chgData name="Md Ishrak Mashroor" userId="e451b154c326eb62" providerId="LiveId" clId="{CEA78450-4F91-469D-B8F2-4266BBE6DA38}" dt="2025-08-12T20:55:00.865" v="1438" actId="20577"/>
       <pc:docMkLst>
         <pc:docMk/>
       </pc:docMkLst>
@@ -1112,8 +1112,8 @@
           </ac:spMkLst>
         </pc:spChg>
       </pc:sldChg>
-      <pc:sldChg chg="delSp modSp mod">
-        <pc:chgData name="Md Ishrak Mashroor" userId="e451b154c326eb62" providerId="LiveId" clId="{CEA78450-4F91-469D-B8F2-4266BBE6DA38}" dt="2025-08-12T19:38:54.870" v="246" actId="478"/>
+      <pc:sldChg chg="addSp delSp modSp mod">
+        <pc:chgData name="Md Ishrak Mashroor" userId="e451b154c326eb62" providerId="LiveId" clId="{CEA78450-4F91-469D-B8F2-4266BBE6DA38}" dt="2025-08-12T20:40:55.309" v="1100" actId="688"/>
         <pc:sldMkLst>
           <pc:docMk/>
           <pc:sldMk cId="0" sldId="267"/>
@@ -1126,6 +1126,14 @@
             <ac:spMk id="2" creationId="{00000000-0000-0000-0000-000000000000}"/>
           </ac:spMkLst>
         </pc:spChg>
+        <pc:spChg chg="add mod">
+          <ac:chgData name="Md Ishrak Mashroor" userId="e451b154c326eb62" providerId="LiveId" clId="{CEA78450-4F91-469D-B8F2-4266BBE6DA38}" dt="2025-08-12T20:39:59.113" v="1081" actId="20577"/>
+          <ac:spMkLst>
+            <pc:docMk/>
+            <pc:sldMk cId="0" sldId="267"/>
+            <ac:spMk id="2" creationId="{3F6D43F1-609B-C340-4B1F-EB9C805A8CCB}"/>
+          </ac:spMkLst>
+        </pc:spChg>
         <pc:spChg chg="del">
           <ac:chgData name="Md Ishrak Mashroor" userId="e451b154c326eb62" providerId="LiveId" clId="{CEA78450-4F91-469D-B8F2-4266BBE6DA38}" dt="2025-08-12T19:38:54.870" v="246" actId="478"/>
           <ac:spMkLst>
@@ -1142,6 +1150,14 @@
             <ac:spMk id="4" creationId="{00000000-0000-0000-0000-000000000000}"/>
           </ac:spMkLst>
         </pc:spChg>
+        <pc:spChg chg="add del mod">
+          <ac:chgData name="Md Ishrak Mashroor" userId="e451b154c326eb62" providerId="LiveId" clId="{CEA78450-4F91-469D-B8F2-4266BBE6DA38}" dt="2025-08-12T20:36:08.154" v="974" actId="478"/>
+          <ac:spMkLst>
+            <pc:docMk/>
+            <pc:sldMk cId="0" sldId="267"/>
+            <ac:spMk id="4" creationId="{2A42CFBB-E9EC-9BA4-519A-52F9133382E0}"/>
+          </ac:spMkLst>
+        </pc:spChg>
         <pc:spChg chg="del">
           <ac:chgData name="Md Ishrak Mashroor" userId="e451b154c326eb62" providerId="LiveId" clId="{CEA78450-4F91-469D-B8F2-4266BBE6DA38}" dt="2025-08-12T19:38:54.870" v="246" actId="478"/>
           <ac:spMkLst>
@@ -1150,6 +1166,14 @@
             <ac:spMk id="5" creationId="{00000000-0000-0000-0000-000000000000}"/>
           </ac:spMkLst>
         </pc:spChg>
+        <pc:spChg chg="add mod">
+          <ac:chgData name="Md Ishrak Mashroor" userId="e451b154c326eb62" providerId="LiveId" clId="{CEA78450-4F91-469D-B8F2-4266BBE6DA38}" dt="2025-08-12T20:40:02.782" v="1083" actId="20577"/>
+          <ac:spMkLst>
+            <pc:docMk/>
+            <pc:sldMk cId="0" sldId="267"/>
+            <ac:spMk id="5" creationId="{A36B51BC-C933-2E33-1501-74AE30C8D14C}"/>
+          </ac:spMkLst>
+        </pc:spChg>
         <pc:spChg chg="del">
           <ac:chgData name="Md Ishrak Mashroor" userId="e451b154c326eb62" providerId="LiveId" clId="{CEA78450-4F91-469D-B8F2-4266BBE6DA38}" dt="2025-08-12T19:38:54.870" v="246" actId="478"/>
           <ac:spMkLst>
@@ -1158,8 +1182,16 @@
             <ac:spMk id="7" creationId="{00000000-0000-0000-0000-000000000000}"/>
           </ac:spMkLst>
         </pc:spChg>
+        <pc:spChg chg="add mod">
+          <ac:chgData name="Md Ishrak Mashroor" userId="e451b154c326eb62" providerId="LiveId" clId="{CEA78450-4F91-469D-B8F2-4266BBE6DA38}" dt="2025-08-12T20:40:06.718" v="1085" actId="20577"/>
+          <ac:spMkLst>
+            <pc:docMk/>
+            <pc:sldMk cId="0" sldId="267"/>
+            <ac:spMk id="7" creationId="{CC66D59F-FCA7-33CB-A9DD-88F3AE8D21FD}"/>
+          </ac:spMkLst>
+        </pc:spChg>
         <pc:spChg chg="mod">
-          <ac:chgData name="Md Ishrak Mashroor" userId="e451b154c326eb62" providerId="LiveId" clId="{CEA78450-4F91-469D-B8F2-4266BBE6DA38}" dt="2025-08-12T19:38:29.410" v="241" actId="1076"/>
+          <ac:chgData name="Md Ishrak Mashroor" userId="e451b154c326eb62" providerId="LiveId" clId="{CEA78450-4F91-469D-B8F2-4266BBE6DA38}" dt="2025-08-12T20:37:34.561" v="993" actId="404"/>
           <ac:spMkLst>
             <pc:docMk/>
             <pc:sldMk cId="0" sldId="267"/>
@@ -1167,7 +1199,7 @@
           </ac:spMkLst>
         </pc:spChg>
         <pc:spChg chg="mod">
-          <ac:chgData name="Md Ishrak Mashroor" userId="e451b154c326eb62" providerId="LiveId" clId="{CEA78450-4F91-469D-B8F2-4266BBE6DA38}" dt="2025-08-12T19:38:43.699" v="245" actId="1076"/>
+          <ac:chgData name="Md Ishrak Mashroor" userId="e451b154c326eb62" providerId="LiveId" clId="{CEA78450-4F91-469D-B8F2-4266BBE6DA38}" dt="2025-08-12T20:38:31.017" v="1052" actId="404"/>
           <ac:spMkLst>
             <pc:docMk/>
             <pc:sldMk cId="0" sldId="267"/>
@@ -1175,24 +1207,72 @@
           </ac:spMkLst>
         </pc:spChg>
         <pc:spChg chg="mod">
-          <ac:chgData name="Md Ishrak Mashroor" userId="e451b154c326eb62" providerId="LiveId" clId="{CEA78450-4F91-469D-B8F2-4266BBE6DA38}" dt="2025-08-12T19:38:37.347" v="243" actId="1076"/>
+          <ac:chgData name="Md Ishrak Mashroor" userId="e451b154c326eb62" providerId="LiveId" clId="{CEA78450-4F91-469D-B8F2-4266BBE6DA38}" dt="2025-08-12T20:39:42.851" v="1078" actId="20577"/>
           <ac:spMkLst>
             <pc:docMk/>
             <pc:sldMk cId="0" sldId="267"/>
             <ac:spMk id="19" creationId="{00000000-0000-0000-0000-000000000000}"/>
           </ac:spMkLst>
         </pc:spChg>
+        <pc:spChg chg="add mod">
+          <ac:chgData name="Md Ishrak Mashroor" userId="e451b154c326eb62" providerId="LiveId" clId="{CEA78450-4F91-469D-B8F2-4266BBE6DA38}" dt="2025-08-12T20:40:53.405" v="1096" actId="688"/>
+          <ac:spMkLst>
+            <pc:docMk/>
+            <pc:sldMk cId="0" sldId="267"/>
+            <ac:spMk id="20" creationId="{220B4C42-818B-941A-AE29-174D63C30A16}"/>
+          </ac:spMkLst>
+        </pc:spChg>
+        <pc:spChg chg="add mod">
+          <ac:chgData name="Md Ishrak Mashroor" userId="e451b154c326eb62" providerId="LiveId" clId="{CEA78450-4F91-469D-B8F2-4266BBE6DA38}" dt="2025-08-12T20:40:53.907" v="1097" actId="688"/>
+          <ac:spMkLst>
+            <pc:docMk/>
+            <pc:sldMk cId="0" sldId="267"/>
+            <ac:spMk id="21" creationId="{80B9A19D-ECE6-AC83-5791-24CA7E18C417}"/>
+          </ac:spMkLst>
+        </pc:spChg>
+        <pc:spChg chg="add mod">
+          <ac:chgData name="Md Ishrak Mashroor" userId="e451b154c326eb62" providerId="LiveId" clId="{CEA78450-4F91-469D-B8F2-4266BBE6DA38}" dt="2025-08-12T20:40:55.309" v="1100" actId="688"/>
+          <ac:spMkLst>
+            <pc:docMk/>
+            <pc:sldMk cId="0" sldId="267"/>
+            <ac:spMk id="22" creationId="{760D0A52-9466-8F91-7270-D7664C938F27}"/>
+          </ac:spMkLst>
+        </pc:spChg>
+        <pc:spChg chg="add mod">
+          <ac:chgData name="Md Ishrak Mashroor" userId="e451b154c326eb62" providerId="LiveId" clId="{CEA78450-4F91-469D-B8F2-4266BBE6DA38}" dt="2025-08-12T20:39:11.713" v="1072"/>
+          <ac:spMkLst>
+            <pc:docMk/>
+            <pc:sldMk cId="0" sldId="267"/>
+            <ac:spMk id="23" creationId="{4EC47BE2-44D3-2BF5-8C9D-325AC8B0E209}"/>
+          </ac:spMkLst>
+        </pc:spChg>
+        <pc:spChg chg="add mod">
+          <ac:chgData name="Md Ishrak Mashroor" userId="e451b154c326eb62" providerId="LiveId" clId="{CEA78450-4F91-469D-B8F2-4266BBE6DA38}" dt="2025-08-12T20:39:11.944" v="1073"/>
+          <ac:spMkLst>
+            <pc:docMk/>
+            <pc:sldMk cId="0" sldId="267"/>
+            <ac:spMk id="24" creationId="{634D4DAB-F312-5019-A9D7-543E840D1C4A}"/>
+          </ac:spMkLst>
+        </pc:spChg>
         <pc:grpChg chg="mod">
-          <ac:chgData name="Md Ishrak Mashroor" userId="e451b154c326eb62" providerId="LiveId" clId="{CEA78450-4F91-469D-B8F2-4266BBE6DA38}" dt="2025-08-12T19:38:19.871" v="239" actId="1076"/>
+          <ac:chgData name="Md Ishrak Mashroor" userId="e451b154c326eb62" providerId="LiveId" clId="{CEA78450-4F91-469D-B8F2-4266BBE6DA38}" dt="2025-08-12T20:36:42.130" v="983" actId="1076"/>
           <ac:grpSpMkLst>
             <pc:docMk/>
             <pc:sldMk cId="0" sldId="267"/>
             <ac:grpSpMk id="8" creationId="{00000000-0000-0000-0000-000000000000}"/>
           </ac:grpSpMkLst>
         </pc:grpChg>
+        <pc:grpChg chg="mod">
+          <ac:chgData name="Md Ishrak Mashroor" userId="e451b154c326eb62" providerId="LiveId" clId="{CEA78450-4F91-469D-B8F2-4266BBE6DA38}" dt="2025-08-12T20:40:31.530" v="1091" actId="1076"/>
+          <ac:grpSpMkLst>
+            <pc:docMk/>
+            <pc:sldMk cId="0" sldId="267"/>
+            <ac:grpSpMk id="12" creationId="{00000000-0000-0000-0000-000000000000}"/>
+          </ac:grpSpMkLst>
+        </pc:grpChg>
       </pc:sldChg>
-      <pc:sldChg chg="delSp modSp mod">
-        <pc:chgData name="Md Ishrak Mashroor" userId="e451b154c326eb62" providerId="LiveId" clId="{CEA78450-4F91-469D-B8F2-4266BBE6DA38}" dt="2025-08-12T19:45:13.326" v="257" actId="478"/>
+      <pc:sldChg chg="addSp delSp modSp mod">
+        <pc:chgData name="Md Ishrak Mashroor" userId="e451b154c326eb62" providerId="LiveId" clId="{CEA78450-4F91-469D-B8F2-4266BBE6DA38}" dt="2025-08-12T20:54:50.486" v="1436" actId="1076"/>
         <pc:sldMkLst>
           <pc:docMk/>
           <pc:sldMk cId="0" sldId="268"/>
@@ -1205,6 +1285,14 @@
             <ac:spMk id="2" creationId="{00000000-0000-0000-0000-000000000000}"/>
           </ac:spMkLst>
         </pc:spChg>
+        <pc:spChg chg="add mod">
+          <ac:chgData name="Md Ishrak Mashroor" userId="e451b154c326eb62" providerId="LiveId" clId="{CEA78450-4F91-469D-B8F2-4266BBE6DA38}" dt="2025-08-12T20:53:13.277" v="1426" actId="1076"/>
+          <ac:spMkLst>
+            <pc:docMk/>
+            <pc:sldMk cId="0" sldId="268"/>
+            <ac:spMk id="2" creationId="{BBCD67E1-A09B-89E1-2982-09DCA59C5AF3}"/>
+          </ac:spMkLst>
+        </pc:spChg>
         <pc:spChg chg="del">
           <ac:chgData name="Md Ishrak Mashroor" userId="e451b154c326eb62" providerId="LiveId" clId="{CEA78450-4F91-469D-B8F2-4266BBE6DA38}" dt="2025-08-12T19:45:13.326" v="257" actId="478"/>
           <ac:spMkLst>
@@ -1213,6 +1301,14 @@
             <ac:spMk id="3" creationId="{00000000-0000-0000-0000-000000000000}"/>
           </ac:spMkLst>
         </pc:spChg>
+        <pc:spChg chg="add mod">
+          <ac:chgData name="Md Ishrak Mashroor" userId="e451b154c326eb62" providerId="LiveId" clId="{CEA78450-4F91-469D-B8F2-4266BBE6DA38}" dt="2025-08-12T20:53:21.675" v="1428" actId="1076"/>
+          <ac:spMkLst>
+            <pc:docMk/>
+            <pc:sldMk cId="0" sldId="268"/>
+            <ac:spMk id="3" creationId="{70B8191E-A8CB-981B-E2B6-18F425E3A21C}"/>
+          </ac:spMkLst>
+        </pc:spChg>
         <pc:spChg chg="del">
           <ac:chgData name="Md Ishrak Mashroor" userId="e451b154c326eb62" providerId="LiveId" clId="{CEA78450-4F91-469D-B8F2-4266BBE6DA38}" dt="2025-08-12T19:45:13.326" v="257" actId="478"/>
           <ac:spMkLst>
@@ -1221,6 +1317,14 @@
             <ac:spMk id="4" creationId="{00000000-0000-0000-0000-000000000000}"/>
           </ac:spMkLst>
         </pc:spChg>
+        <pc:spChg chg="add mod">
+          <ac:chgData name="Md Ishrak Mashroor" userId="e451b154c326eb62" providerId="LiveId" clId="{CEA78450-4F91-469D-B8F2-4266BBE6DA38}" dt="2025-08-12T20:53:17.756" v="1427" actId="1076"/>
+          <ac:spMkLst>
+            <pc:docMk/>
+            <pc:sldMk cId="0" sldId="268"/>
+            <ac:spMk id="4" creationId="{33B1578F-153C-8808-C5C5-BDF10547B9FC}"/>
+          </ac:spMkLst>
+        </pc:spChg>
         <pc:spChg chg="del">
           <ac:chgData name="Md Ishrak Mashroor" userId="e451b154c326eb62" providerId="LiveId" clId="{CEA78450-4F91-469D-B8F2-4266BBE6DA38}" dt="2025-08-12T19:45:13.326" v="257" actId="478"/>
           <ac:spMkLst>
@@ -1229,6 +1333,14 @@
             <ac:spMk id="5" creationId="{00000000-0000-0000-0000-000000000000}"/>
           </ac:spMkLst>
         </pc:spChg>
+        <pc:spChg chg="add mod">
+          <ac:chgData name="Md Ishrak Mashroor" userId="e451b154c326eb62" providerId="LiveId" clId="{CEA78450-4F91-469D-B8F2-4266BBE6DA38}" dt="2025-08-12T20:41:15.051" v="1101"/>
+          <ac:spMkLst>
+            <pc:docMk/>
+            <pc:sldMk cId="0" sldId="268"/>
+            <ac:spMk id="5" creationId="{59947B54-7623-21EB-043B-42F38CC46305}"/>
+          </ac:spMkLst>
+        </pc:spChg>
         <pc:spChg chg="del">
           <ac:chgData name="Md Ishrak Mashroor" userId="e451b154c326eb62" providerId="LiveId" clId="{CEA78450-4F91-469D-B8F2-4266BBE6DA38}" dt="2025-08-12T19:45:13.326" v="257" actId="478"/>
           <ac:spMkLst>
@@ -1237,8 +1349,104 @@
             <ac:spMk id="7" creationId="{00000000-0000-0000-0000-000000000000}"/>
           </ac:spMkLst>
         </pc:spChg>
+        <pc:spChg chg="add mod">
+          <ac:chgData name="Md Ishrak Mashroor" userId="e451b154c326eb62" providerId="LiveId" clId="{CEA78450-4F91-469D-B8F2-4266BBE6DA38}" dt="2025-08-12T20:41:15.370" v="1102"/>
+          <ac:spMkLst>
+            <pc:docMk/>
+            <pc:sldMk cId="0" sldId="268"/>
+            <ac:spMk id="7" creationId="{A3D3EE80-85F2-0444-D7B7-049B54E54BF4}"/>
+          </ac:spMkLst>
+        </pc:spChg>
+        <pc:spChg chg="mod">
+          <ac:chgData name="Md Ishrak Mashroor" userId="e451b154c326eb62" providerId="LiveId" clId="{CEA78450-4F91-469D-B8F2-4266BBE6DA38}" dt="2025-08-12T20:54:43.051" v="1435" actId="1076"/>
+          <ac:spMkLst>
+            <pc:docMk/>
+            <pc:sldMk cId="0" sldId="268"/>
+            <ac:spMk id="11" creationId="{00000000-0000-0000-0000-000000000000}"/>
+          </ac:spMkLst>
+        </pc:spChg>
+        <pc:spChg chg="mod">
+          <ac:chgData name="Md Ishrak Mashroor" userId="e451b154c326eb62" providerId="LiveId" clId="{CEA78450-4F91-469D-B8F2-4266BBE6DA38}" dt="2025-08-12T20:50:41.151" v="1375" actId="1076"/>
+          <ac:spMkLst>
+            <pc:docMk/>
+            <pc:sldMk cId="0" sldId="268"/>
+            <ac:spMk id="13" creationId="{00000000-0000-0000-0000-000000000000}"/>
+          </ac:spMkLst>
+        </pc:spChg>
+        <pc:spChg chg="mod">
+          <ac:chgData name="Md Ishrak Mashroor" userId="e451b154c326eb62" providerId="LiveId" clId="{CEA78450-4F91-469D-B8F2-4266BBE6DA38}" dt="2025-08-12T20:54:18.606" v="1433" actId="20577"/>
+          <ac:spMkLst>
+            <pc:docMk/>
+            <pc:sldMk cId="0" sldId="268"/>
+            <ac:spMk id="18" creationId="{00000000-0000-0000-0000-000000000000}"/>
+          </ac:spMkLst>
+        </pc:spChg>
+        <pc:spChg chg="mod">
+          <ac:chgData name="Md Ishrak Mashroor" userId="e451b154c326eb62" providerId="LiveId" clId="{CEA78450-4F91-469D-B8F2-4266BBE6DA38}" dt="2025-08-12T20:53:32.583" v="1429" actId="20577"/>
+          <ac:spMkLst>
+            <pc:docMk/>
+            <pc:sldMk cId="0" sldId="268"/>
+            <ac:spMk id="19" creationId="{00000000-0000-0000-0000-000000000000}"/>
+          </ac:spMkLst>
+        </pc:spChg>
+        <pc:spChg chg="add mod">
+          <ac:chgData name="Md Ishrak Mashroor" userId="e451b154c326eb62" providerId="LiveId" clId="{CEA78450-4F91-469D-B8F2-4266BBE6DA38}" dt="2025-08-12T20:41:15.668" v="1103"/>
+          <ac:spMkLst>
+            <pc:docMk/>
+            <pc:sldMk cId="0" sldId="268"/>
+            <ac:spMk id="20" creationId="{6ED36036-DFC8-DA09-42E1-766DF245AEDE}"/>
+          </ac:spMkLst>
+        </pc:spChg>
+        <pc:spChg chg="add mod">
+          <ac:chgData name="Md Ishrak Mashroor" userId="e451b154c326eb62" providerId="LiveId" clId="{CEA78450-4F91-469D-B8F2-4266BBE6DA38}" dt="2025-08-12T20:54:50.486" v="1436" actId="1076"/>
+          <ac:spMkLst>
+            <pc:docMk/>
+            <pc:sldMk cId="0" sldId="268"/>
+            <ac:spMk id="21" creationId="{1F7B3657-F8B8-E04B-98E6-AAD2539E1CC7}"/>
+          </ac:spMkLst>
+        </pc:spChg>
+        <pc:spChg chg="add mod">
+          <ac:chgData name="Md Ishrak Mashroor" userId="e451b154c326eb62" providerId="LiveId" clId="{CEA78450-4F91-469D-B8F2-4266BBE6DA38}" dt="2025-08-12T20:54:10.721" v="1432" actId="1076"/>
+          <ac:spMkLst>
+            <pc:docMk/>
+            <pc:sldMk cId="0" sldId="268"/>
+            <ac:spMk id="22" creationId="{7226BA77-1FAE-3D33-3428-9EAAAFBBEE92}"/>
+          </ac:spMkLst>
+        </pc:spChg>
+        <pc:spChg chg="add mod">
+          <ac:chgData name="Md Ishrak Mashroor" userId="e451b154c326eb62" providerId="LiveId" clId="{CEA78450-4F91-469D-B8F2-4266BBE6DA38}" dt="2025-08-12T20:54:32.455" v="1434" actId="1076"/>
+          <ac:spMkLst>
+            <pc:docMk/>
+            <pc:sldMk cId="0" sldId="268"/>
+            <ac:spMk id="23" creationId="{8A64881D-04EF-1C41-3277-0969EEB17515}"/>
+          </ac:spMkLst>
+        </pc:spChg>
+        <pc:spChg chg="add mod">
+          <ac:chgData name="Md Ishrak Mashroor" userId="e451b154c326eb62" providerId="LiveId" clId="{CEA78450-4F91-469D-B8F2-4266BBE6DA38}" dt="2025-08-12T20:41:19.915" v="1107"/>
+          <ac:spMkLst>
+            <pc:docMk/>
+            <pc:sldMk cId="0" sldId="268"/>
+            <ac:spMk id="24" creationId="{C291B877-8AFD-F17D-9190-531CA058AA6C}"/>
+          </ac:spMkLst>
+        </pc:spChg>
         <pc:grpChg chg="mod">
-          <ac:chgData name="Md Ishrak Mashroor" userId="e451b154c326eb62" providerId="LiveId" clId="{CEA78450-4F91-469D-B8F2-4266BBE6DA38}" dt="2025-08-11T18:19:30.782" v="22" actId="1076"/>
+          <ac:chgData name="Md Ishrak Mashroor" userId="e451b154c326eb62" providerId="LiveId" clId="{CEA78450-4F91-469D-B8F2-4266BBE6DA38}" dt="2025-08-12T20:50:48.437" v="1377" actId="14100"/>
+          <ac:grpSpMkLst>
+            <pc:docMk/>
+            <pc:sldMk cId="0" sldId="268"/>
+            <ac:grpSpMk id="8" creationId="{00000000-0000-0000-0000-000000000000}"/>
+          </ac:grpSpMkLst>
+        </pc:grpChg>
+        <pc:grpChg chg="mod">
+          <ac:chgData name="Md Ishrak Mashroor" userId="e451b154c326eb62" providerId="LiveId" clId="{CEA78450-4F91-469D-B8F2-4266BBE6DA38}" dt="2025-08-12T20:50:58.427" v="1378" actId="14100"/>
+          <ac:grpSpMkLst>
+            <pc:docMk/>
+            <pc:sldMk cId="0" sldId="268"/>
+            <ac:grpSpMk id="12" creationId="{00000000-0000-0000-0000-000000000000}"/>
+          </ac:grpSpMkLst>
+        </pc:grpChg>
+        <pc:grpChg chg="mod">
+          <ac:chgData name="Md Ishrak Mashroor" userId="e451b154c326eb62" providerId="LiveId" clId="{CEA78450-4F91-469D-B8F2-4266BBE6DA38}" dt="2025-08-12T20:51:11.675" v="1379" actId="14100"/>
           <ac:grpSpMkLst>
             <pc:docMk/>
             <pc:sldMk cId="0" sldId="268"/>
@@ -1350,7 +1558,7 @@
         </pc:spChg>
       </pc:sldChg>
       <pc:sldChg chg="delSp modSp mod">
-        <pc:chgData name="Md Ishrak Mashroor" userId="e451b154c326eb62" providerId="LiveId" clId="{CEA78450-4F91-469D-B8F2-4266BBE6DA38}" dt="2025-08-12T19:45:53.273" v="266" actId="1076"/>
+        <pc:chgData name="Md Ishrak Mashroor" userId="e451b154c326eb62" providerId="LiveId" clId="{CEA78450-4F91-469D-B8F2-4266BBE6DA38}" dt="2025-08-12T20:55:00.865" v="1438" actId="20577"/>
         <pc:sldMkLst>
           <pc:docMk/>
           <pc:sldMk cId="0" sldId="270"/>
@@ -1361,6 +1569,14 @@
             <pc:docMk/>
             <pc:sldMk cId="0" sldId="270"/>
             <ac:spMk id="2" creationId="{00000000-0000-0000-0000-000000000000}"/>
+          </ac:spMkLst>
+        </pc:spChg>
+        <pc:spChg chg="mod">
+          <ac:chgData name="Md Ishrak Mashroor" userId="e451b154c326eb62" providerId="LiveId" clId="{CEA78450-4F91-469D-B8F2-4266BBE6DA38}" dt="2025-08-12T20:55:00.865" v="1438" actId="20577"/>
+          <ac:spMkLst>
+            <pc:docMk/>
+            <pc:sldMk cId="0" sldId="270"/>
+            <ac:spMk id="7" creationId="{00000000-0000-0000-0000-000000000000}"/>
           </ac:spMkLst>
         </pc:spChg>
         <pc:spChg chg="del">
@@ -6625,7 +6841,7 @@
               </a:lnSpc>
             </a:pPr>
             <a:r>
-              <a:rPr lang="en-US" sz="7200" b="1">
+              <a:rPr lang="en-US" sz="7200" b="1" dirty="0">
                 <a:solidFill>
                   <a:srgbClr val="F7F7F7"/>
                 </a:solidFill>
@@ -6754,7 +6970,7 @@
         <p:spPr>
           <a:xfrm>
             <a:off x="1820849" y="3385208"/>
-            <a:ext cx="4381078" cy="2612390"/>
+            <a:ext cx="4381078" cy="2825453"/>
           </a:xfrm>
           <a:prstGeom prst="rect">
             <a:avLst/>
@@ -6775,7 +6991,7 @@
               </a:spcBef>
             </a:pPr>
             <a:r>
-              <a:rPr lang="en-US" sz="2899" b="1" spc="-57" dirty="0">
+              <a:rPr lang="en-US" sz="2800" b="1" spc="-57" dirty="0">
                 <a:solidFill>
                   <a:srgbClr val="F7F7F7"/>
                 </a:solidFill>
@@ -6784,7 +7000,45 @@
                 <a:cs typeface="Arial Bold"/>
                 <a:sym typeface="Arial Bold"/>
               </a:rPr>
-              <a:t>Cross-platform compatibility (used preprocessor directives to support Windows, Linux, macOS)</a:t>
+              <a:t>Cross-platform compatibility </a:t>
+            </a:r>
+          </a:p>
+          <a:p>
+            <a:pPr algn="ctr">
+              <a:spcBef>
+                <a:spcPct val="0"/>
+              </a:spcBef>
+            </a:pPr>
+            <a:endParaRPr lang="en-US" sz="1400" b="1" spc="-57" dirty="0">
+              <a:solidFill>
+                <a:srgbClr val="F7F7F7"/>
+              </a:solidFill>
+              <a:latin typeface="Arial Bold"/>
+              <a:ea typeface="Arial Bold"/>
+              <a:cs typeface="Arial Bold"/>
+              <a:sym typeface="Arial Bold"/>
+            </a:endParaRPr>
+          </a:p>
+          <a:p>
+            <a:pPr algn="ctr">
+              <a:lnSpc>
+                <a:spcPts val="4059"/>
+              </a:lnSpc>
+              <a:spcBef>
+                <a:spcPct val="0"/>
+              </a:spcBef>
+            </a:pPr>
+            <a:r>
+              <a:rPr lang="en-US" sz="2800" b="1" spc="-57" dirty="0">
+                <a:solidFill>
+                  <a:srgbClr val="F7F7F7"/>
+                </a:solidFill>
+                <a:latin typeface="Arial Bold"/>
+                <a:ea typeface="Arial Bold"/>
+                <a:cs typeface="Arial Bold"/>
+                <a:sym typeface="Arial Bold"/>
+              </a:rPr>
+              <a:t>used preprocessor directives to support Windows, Linux, macOS</a:t>
             </a:r>
           </a:p>
         </p:txBody>
@@ -7010,7 +7264,7 @@
         <p:spPr>
           <a:xfrm>
             <a:off x="12485994" y="3635799"/>
-            <a:ext cx="4191271" cy="2257477"/>
+            <a:ext cx="4191271" cy="2423356"/>
           </a:xfrm>
           <a:prstGeom prst="rect">
             <a:avLst/>
@@ -7037,20 +7291,13 @@
                 <a:cs typeface="Arial Bold"/>
                 <a:sym typeface="Arial Bold"/>
               </a:rPr>
-              <a:t>Terminal formatting </a:t>
-            </a:r>
-          </a:p>
-          <a:p>
-            <a:pPr algn="ctr">
-              <a:lnSpc>
-                <a:spcPts val="4479"/>
-              </a:lnSpc>
-              <a:spcBef>
-                <a:spcPct val="0"/>
-              </a:spcBef>
-            </a:pPr>
-            <a:r>
-              <a:rPr lang="en-US" sz="3199" b="1" spc="-63" dirty="0">
+              <a:t>Terminal formatting</a:t>
+            </a:r>
+          </a:p>
+          <a:p>
+            <a:pPr algn="ctr"/>
+            <a:r>
+              <a:rPr lang="en-US" sz="2400" b="1" spc="-63" dirty="0">
                 <a:solidFill>
                   <a:srgbClr val="F7F7F7"/>
                 </a:solidFill>
@@ -7059,7 +7306,38 @@
                 <a:cs typeface="Arial Bold"/>
                 <a:sym typeface="Arial Bold"/>
               </a:rPr>
-              <a:t> Used ANSI codes; managed screen clears</a:t>
+              <a:t> </a:t>
+            </a:r>
+          </a:p>
+          <a:p>
+            <a:pPr algn="ctr">
+              <a:spcBef>
+                <a:spcPct val="0"/>
+              </a:spcBef>
+            </a:pPr>
+            <a:r>
+              <a:rPr lang="en-US" sz="2400" b="1" spc="-63" dirty="0">
+                <a:solidFill>
+                  <a:srgbClr val="F7F7F7"/>
+                </a:solidFill>
+                <a:latin typeface="Arial Bold"/>
+                <a:ea typeface="Arial Bold"/>
+                <a:cs typeface="Arial Bold"/>
+                <a:sym typeface="Arial Bold"/>
+              </a:rPr>
+              <a:t> </a:t>
+            </a:r>
+            <a:r>
+              <a:rPr lang="en-US" sz="3199" b="1" spc="-63" dirty="0">
+                <a:solidFill>
+                  <a:srgbClr val="F7F7F7"/>
+                </a:solidFill>
+                <a:latin typeface="Arial Bold"/>
+                <a:ea typeface="Arial Bold"/>
+                <a:cs typeface="Arial Bold"/>
+                <a:sym typeface="Arial Bold"/>
+              </a:rPr>
+              <a:t>Used ANSI codes; managed screen clears</a:t>
             </a:r>
           </a:p>
         </p:txBody>
@@ -7073,7 +7351,7 @@
         <p:spPr>
           <a:xfrm>
             <a:off x="7172430" y="3635799"/>
-            <a:ext cx="3943139" cy="2158283"/>
+            <a:ext cx="3943139" cy="2404504"/>
           </a:xfrm>
           <a:prstGeom prst="rect">
             <a:avLst/>
@@ -7100,7 +7378,22 @@
                 <a:cs typeface="Arial Bold"/>
                 <a:sym typeface="Arial Bold"/>
               </a:rPr>
-              <a:t>Input Validation </a:t>
+              <a:t>Input Validation</a:t>
+            </a:r>
+          </a:p>
+          <a:p>
+            <a:pPr algn="ctr"/>
+            <a:r>
+              <a:rPr lang="en-US" sz="1600" b="1" spc="-61" dirty="0">
+                <a:solidFill>
+                  <a:srgbClr val="F7F7F7"/>
+                </a:solidFill>
+                <a:latin typeface="Arial Bold"/>
+                <a:ea typeface="Arial Bold"/>
+                <a:cs typeface="Arial Bold"/>
+                <a:sym typeface="Arial Bold"/>
+              </a:rPr>
+              <a:t> </a:t>
             </a:r>
           </a:p>
           <a:p>
@@ -7123,6 +7416,252 @@
                 <a:sym typeface="Arial Bold"/>
               </a:rPr>
               <a:t>Had to flush input buffer to prevent infinite loops</a:t>
+            </a:r>
+          </a:p>
+        </p:txBody>
+      </p:sp>
+      <p:sp>
+        <p:nvSpPr>
+          <p:cNvPr id="2" name="TextBox 1">
+            <a:extLst>
+              <a:ext uri="{FF2B5EF4-FFF2-40B4-BE49-F238E27FC236}">
+                <a16:creationId xmlns:a16="http://schemas.microsoft.com/office/drawing/2014/main" id="{3F6D43F1-609B-C340-4B1F-EB9C805A8CCB}"/>
+              </a:ext>
+            </a:extLst>
+          </p:cNvPr>
+          <p:cNvSpPr txBox="1"/>
+          <p:nvPr/>
+        </p:nvSpPr>
+        <p:spPr>
+          <a:xfrm>
+            <a:off x="3522033" y="3115071"/>
+            <a:ext cx="1039067" cy="307777"/>
+          </a:xfrm>
+          <a:prstGeom prst="rect">
+            <a:avLst/>
+          </a:prstGeom>
+          <a:noFill/>
+        </p:spPr>
+        <p:txBody>
+          <a:bodyPr wrap="none" rtlCol="0">
+            <a:spAutoFit/>
+          </a:bodyPr>
+          <a:lstStyle/>
+          <a:p>
+            <a:r>
+              <a:rPr lang="en-US" sz="1400" b="1" dirty="0">
+                <a:solidFill>
+                  <a:schemeClr val="bg1"/>
+                </a:solidFill>
+                <a:latin typeface="Arial Bold"/>
+                <a:cs typeface="Arial Bold"/>
+              </a:rPr>
+              <a:t>Challenge</a:t>
+            </a:r>
+          </a:p>
+        </p:txBody>
+      </p:sp>
+      <p:sp>
+        <p:nvSpPr>
+          <p:cNvPr id="5" name="TextBox 4">
+            <a:extLst>
+              <a:ext uri="{FF2B5EF4-FFF2-40B4-BE49-F238E27FC236}">
+                <a16:creationId xmlns:a16="http://schemas.microsoft.com/office/drawing/2014/main" id="{A36B51BC-C933-2E33-1501-74AE30C8D14C}"/>
+              </a:ext>
+            </a:extLst>
+          </p:cNvPr>
+          <p:cNvSpPr txBox="1"/>
+          <p:nvPr/>
+        </p:nvSpPr>
+        <p:spPr>
+          <a:xfrm>
+            <a:off x="8639694" y="3238593"/>
+            <a:ext cx="1039067" cy="307777"/>
+          </a:xfrm>
+          <a:prstGeom prst="rect">
+            <a:avLst/>
+          </a:prstGeom>
+          <a:noFill/>
+        </p:spPr>
+        <p:txBody>
+          <a:bodyPr wrap="none" rtlCol="0">
+            <a:spAutoFit/>
+          </a:bodyPr>
+          <a:lstStyle/>
+          <a:p>
+            <a:r>
+              <a:rPr lang="en-US" sz="1400" b="1" dirty="0">
+                <a:solidFill>
+                  <a:schemeClr val="bg1"/>
+                </a:solidFill>
+                <a:latin typeface="Arial Bold"/>
+                <a:cs typeface="Arial Bold"/>
+              </a:rPr>
+              <a:t>Challenge</a:t>
+            </a:r>
+          </a:p>
+        </p:txBody>
+      </p:sp>
+      <p:sp>
+        <p:nvSpPr>
+          <p:cNvPr id="7" name="TextBox 6">
+            <a:extLst>
+              <a:ext uri="{FF2B5EF4-FFF2-40B4-BE49-F238E27FC236}">
+                <a16:creationId xmlns:a16="http://schemas.microsoft.com/office/drawing/2014/main" id="{CC66D59F-FCA7-33CB-A9DD-88F3AE8D21FD}"/>
+              </a:ext>
+            </a:extLst>
+          </p:cNvPr>
+          <p:cNvSpPr txBox="1"/>
+          <p:nvPr/>
+        </p:nvSpPr>
+        <p:spPr>
+          <a:xfrm>
+            <a:off x="13982421" y="3267594"/>
+            <a:ext cx="1039067" cy="307777"/>
+          </a:xfrm>
+          <a:prstGeom prst="rect">
+            <a:avLst/>
+          </a:prstGeom>
+          <a:noFill/>
+        </p:spPr>
+        <p:txBody>
+          <a:bodyPr wrap="none" rtlCol="0">
+            <a:spAutoFit/>
+          </a:bodyPr>
+          <a:lstStyle/>
+          <a:p>
+            <a:r>
+              <a:rPr lang="en-US" sz="1400" b="1" dirty="0">
+                <a:solidFill>
+                  <a:schemeClr val="bg1"/>
+                </a:solidFill>
+                <a:latin typeface="Arial Bold"/>
+                <a:cs typeface="Arial Bold"/>
+              </a:rPr>
+              <a:t>Challenge</a:t>
+            </a:r>
+          </a:p>
+        </p:txBody>
+      </p:sp>
+      <p:sp>
+        <p:nvSpPr>
+          <p:cNvPr id="20" name="TextBox 19">
+            <a:extLst>
+              <a:ext uri="{FF2B5EF4-FFF2-40B4-BE49-F238E27FC236}">
+                <a16:creationId xmlns:a16="http://schemas.microsoft.com/office/drawing/2014/main" id="{220B4C42-818B-941A-AE29-174D63C30A16}"/>
+              </a:ext>
+            </a:extLst>
+          </p:cNvPr>
+          <p:cNvSpPr txBox="1"/>
+          <p:nvPr/>
+        </p:nvSpPr>
+        <p:spPr>
+          <a:xfrm>
+            <a:off x="12485993" y="4229737"/>
+            <a:ext cx="899605" cy="307777"/>
+          </a:xfrm>
+          <a:prstGeom prst="rect">
+            <a:avLst/>
+          </a:prstGeom>
+          <a:noFill/>
+        </p:spPr>
+        <p:txBody>
+          <a:bodyPr wrap="none" rtlCol="0">
+            <a:spAutoFit/>
+          </a:bodyPr>
+          <a:lstStyle/>
+          <a:p>
+            <a:r>
+              <a:rPr lang="en-US" sz="1400" b="1" dirty="0">
+                <a:solidFill>
+                  <a:schemeClr val="bg1"/>
+                </a:solidFill>
+                <a:latin typeface="Arial Bold"/>
+                <a:cs typeface="Arial Bold"/>
+              </a:rPr>
+              <a:t>Solution</a:t>
+            </a:r>
+          </a:p>
+        </p:txBody>
+      </p:sp>
+      <p:sp>
+        <p:nvSpPr>
+          <p:cNvPr id="21" name="TextBox 20">
+            <a:extLst>
+              <a:ext uri="{FF2B5EF4-FFF2-40B4-BE49-F238E27FC236}">
+                <a16:creationId xmlns:a16="http://schemas.microsoft.com/office/drawing/2014/main" id="{80B9A19D-ECE6-AC83-5791-24CA7E18C417}"/>
+              </a:ext>
+            </a:extLst>
+          </p:cNvPr>
+          <p:cNvSpPr txBox="1"/>
+          <p:nvPr/>
+        </p:nvSpPr>
+        <p:spPr>
+          <a:xfrm>
+            <a:off x="7046635" y="4229736"/>
+            <a:ext cx="899605" cy="307777"/>
+          </a:xfrm>
+          <a:prstGeom prst="rect">
+            <a:avLst/>
+          </a:prstGeom>
+          <a:noFill/>
+        </p:spPr>
+        <p:txBody>
+          <a:bodyPr wrap="none" rtlCol="0">
+            <a:spAutoFit/>
+          </a:bodyPr>
+          <a:lstStyle/>
+          <a:p>
+            <a:r>
+              <a:rPr lang="en-US" sz="1400" b="1" dirty="0">
+                <a:solidFill>
+                  <a:schemeClr val="bg1"/>
+                </a:solidFill>
+                <a:latin typeface="Arial Bold"/>
+                <a:cs typeface="Arial Bold"/>
+              </a:rPr>
+              <a:t>Solution</a:t>
+            </a:r>
+          </a:p>
+        </p:txBody>
+      </p:sp>
+      <p:sp>
+        <p:nvSpPr>
+          <p:cNvPr id="22" name="TextBox 21">
+            <a:extLst>
+              <a:ext uri="{FF2B5EF4-FFF2-40B4-BE49-F238E27FC236}">
+                <a16:creationId xmlns:a16="http://schemas.microsoft.com/office/drawing/2014/main" id="{760D0A52-9466-8F91-7270-D7664C938F27}"/>
+              </a:ext>
+            </a:extLst>
+          </p:cNvPr>
+          <p:cNvSpPr txBox="1"/>
+          <p:nvPr/>
+        </p:nvSpPr>
+        <p:spPr>
+          <a:xfrm>
+            <a:off x="1851555" y="4367135"/>
+            <a:ext cx="899605" cy="307777"/>
+          </a:xfrm>
+          <a:prstGeom prst="rect">
+            <a:avLst/>
+          </a:prstGeom>
+          <a:noFill/>
+        </p:spPr>
+        <p:txBody>
+          <a:bodyPr wrap="none" rtlCol="0">
+            <a:spAutoFit/>
+          </a:bodyPr>
+          <a:lstStyle/>
+          <a:p>
+            <a:r>
+              <a:rPr lang="en-US" sz="1400" b="1" dirty="0">
+                <a:solidFill>
+                  <a:schemeClr val="bg1"/>
+                </a:solidFill>
+                <a:latin typeface="Arial Bold"/>
+                <a:cs typeface="Arial Bold"/>
+              </a:rPr>
+              <a:t>Solution</a:t>
             </a:r>
           </a:p>
         </p:txBody>
@@ -7209,8 +7748,8 @@
         </p:nvGrpSpPr>
         <p:grpSpPr>
           <a:xfrm rot="-5400000">
-            <a:off x="1969344" y="2677255"/>
-            <a:ext cx="4084088" cy="4381078"/>
+            <a:off x="1214213" y="3432386"/>
+            <a:ext cx="5594350" cy="4381078"/>
             <a:chOff x="0" y="0"/>
             <a:chExt cx="1075645" cy="1153864"/>
           </a:xfrm>
@@ -7315,8 +7854,8 @@
         </p:nvSpPr>
         <p:spPr>
           <a:xfrm>
-            <a:off x="1820849" y="3744421"/>
-            <a:ext cx="4381078" cy="1728470"/>
+            <a:off x="1839794" y="3851725"/>
+            <a:ext cx="4381078" cy="2834559"/>
           </a:xfrm>
           <a:prstGeom prst="rect">
             <a:avLst/>
@@ -7346,7 +7885,72 @@
                 <a:cs typeface="Arial Bold"/>
                 <a:sym typeface="Arial Bold"/>
               </a:rPr>
-              <a:t>AI logic — Balanced simplicity with challenge</a:t>
+              <a:t>Near-Full Board Looping</a:t>
+            </a:r>
+          </a:p>
+          <a:p>
+            <a:pPr algn="ctr">
+              <a:lnSpc>
+                <a:spcPts val="4479"/>
+              </a:lnSpc>
+              <a:spcBef>
+                <a:spcPct val="0"/>
+              </a:spcBef>
+            </a:pPr>
+            <a:endParaRPr lang="en-US" sz="3199" b="1" spc="-63" dirty="0">
+              <a:solidFill>
+                <a:srgbClr val="F7F7F7"/>
+              </a:solidFill>
+              <a:latin typeface="Arial Bold"/>
+              <a:ea typeface="Arial Bold"/>
+              <a:cs typeface="Arial Bold"/>
+              <a:sym typeface="Arial Bold"/>
+            </a:endParaRPr>
+          </a:p>
+          <a:p>
+            <a:pPr algn="ctr">
+              <a:lnSpc>
+                <a:spcPts val="4479"/>
+              </a:lnSpc>
+              <a:spcBef>
+                <a:spcPct val="0"/>
+              </a:spcBef>
+            </a:pPr>
+            <a:r>
+              <a:rPr lang="en-US" sz="3199" b="1" spc="-63" dirty="0">
+                <a:solidFill>
+                  <a:srgbClr val="F7F7F7"/>
+                </a:solidFill>
+                <a:latin typeface="Arial Bold"/>
+                <a:ea typeface="Arial Bold"/>
+                <a:cs typeface="Arial Bold"/>
+                <a:sym typeface="Arial Bold"/>
+              </a:rPr>
+              <a:t> </a:t>
+            </a:r>
+            <a:r>
+              <a:rPr lang="en-US" sz="3199" b="1" spc="-63" dirty="0">
+                <a:solidFill>
+                  <a:srgbClr val="F7F7F7"/>
+                </a:solidFill>
+                <a:latin typeface="Consolas" panose="020B0609020204030204" pitchFamily="49" charset="0"/>
+                <a:ea typeface="Arial Bold"/>
+                <a:cs typeface="Arial Bold"/>
+                <a:sym typeface="Arial Bold"/>
+              </a:rPr>
+              <a:t>Break; </a:t>
+            </a:r>
+            <a:r>
+              <a:rPr lang="en-US" sz="3199" b="1" spc="-63" dirty="0">
+                <a:solidFill>
+                  <a:srgbClr val="F7F7F7"/>
+                </a:solidFill>
+                <a:latin typeface="Arial Bold"/>
+                <a:ea typeface="Arial Bold"/>
+                <a:cs typeface="Arial Bold"/>
+                <a:sym typeface="Arial Bold"/>
+              </a:rPr>
+              <a:t>on valid cell found</a:t>
             </a:r>
           </a:p>
         </p:txBody>
@@ -7359,10 +7963,10 @@
         </p:nvGrpSpPr>
         <p:grpSpPr>
           <a:xfrm rot="-5400000">
-            <a:off x="7101956" y="2677255"/>
-            <a:ext cx="4084088" cy="4381078"/>
-            <a:chOff x="0" y="0"/>
-            <a:chExt cx="1075645" cy="1153864"/>
+            <a:off x="6318951" y="3062442"/>
+            <a:ext cx="5594350" cy="5120966"/>
+            <a:chOff x="0" y="-104775"/>
+            <a:chExt cx="1075645" cy="1258639"/>
           </a:xfrm>
         </p:grpSpPr>
         <p:sp>
@@ -7465,8 +8069,8 @@
         </p:nvGrpSpPr>
         <p:grpSpPr>
           <a:xfrm rot="-5400000">
-            <a:off x="12341153" y="2661901"/>
-            <a:ext cx="4084088" cy="4381078"/>
+            <a:off x="11795453" y="3207600"/>
+            <a:ext cx="5594351" cy="4799942"/>
             <a:chOff x="0" y="0"/>
             <a:chExt cx="1075645" cy="1153864"/>
           </a:xfrm>
@@ -7572,7 +8176,7 @@
         <p:spPr>
           <a:xfrm>
             <a:off x="12296187" y="3744421"/>
-            <a:ext cx="4381078" cy="2290445"/>
+            <a:ext cx="4381078" cy="3421193"/>
           </a:xfrm>
           <a:prstGeom prst="rect">
             <a:avLst/>
@@ -7593,7 +8197,7 @@
               </a:spcBef>
             </a:pPr>
             <a:r>
-              <a:rPr lang="en-US" sz="3199" b="1" spc="-63">
+              <a:rPr lang="en-US" sz="3199" b="1" spc="-63" dirty="0">
                 <a:solidFill>
                   <a:srgbClr val="F7F7F7"/>
                 </a:solidFill>
@@ -7602,8 +8206,102 @@
                 <a:cs typeface="Arial Bold"/>
                 <a:sym typeface="Arial Bold"/>
               </a:rPr>
-              <a:t>Modular design — Separated logic into game.c, board.c, GameAI.c</a:t>
-            </a:r>
+              <a:t>Redundancy AI Win check</a:t>
+            </a:r>
+          </a:p>
+          <a:p>
+            <a:pPr algn="ctr">
+              <a:lnSpc>
+                <a:spcPts val="4479"/>
+              </a:lnSpc>
+              <a:spcBef>
+                <a:spcPct val="0"/>
+              </a:spcBef>
+            </a:pPr>
+            <a:endParaRPr lang="en-US" sz="3199" b="1" spc="-63" dirty="0">
+              <a:solidFill>
+                <a:srgbClr val="F7F7F7"/>
+              </a:solidFill>
+              <a:latin typeface="Arial Bold"/>
+              <a:ea typeface="Arial Bold"/>
+              <a:cs typeface="Arial Bold"/>
+              <a:sym typeface="Arial Bold"/>
+            </a:endParaRPr>
+          </a:p>
+          <a:p>
+            <a:pPr algn="ctr">
+              <a:lnSpc>
+                <a:spcPts val="4479"/>
+              </a:lnSpc>
+              <a:spcBef>
+                <a:spcPct val="0"/>
+              </a:spcBef>
+            </a:pPr>
+            <a:r>
+              <a:rPr lang="en-US" sz="3199" b="1" spc="-63" dirty="0">
+                <a:solidFill>
+                  <a:srgbClr val="F7F7F7"/>
+                </a:solidFill>
+                <a:latin typeface="Arial Bold"/>
+                <a:ea typeface="Arial Bold"/>
+                <a:cs typeface="Arial Bold"/>
+                <a:sym typeface="Arial Bold"/>
+              </a:rPr>
+              <a:t>Reused existing </a:t>
+            </a:r>
+          </a:p>
+          <a:p>
+            <a:pPr algn="ctr">
+              <a:lnSpc>
+                <a:spcPts val="4479"/>
+              </a:lnSpc>
+              <a:spcBef>
+                <a:spcPct val="0"/>
+              </a:spcBef>
+            </a:pPr>
+            <a:r>
+              <a:rPr lang="en-US" sz="3199" b="1" spc="-63" dirty="0">
+                <a:solidFill>
+                  <a:srgbClr val="F7F7F7"/>
+                </a:solidFill>
+                <a:latin typeface="Arial Bold"/>
+                <a:ea typeface="Arial Bold"/>
+                <a:cs typeface="Arial Bold"/>
+                <a:sym typeface="Arial Bold"/>
+              </a:rPr>
+              <a:t>Player/vs/Player</a:t>
+            </a:r>
+          </a:p>
+          <a:p>
+            <a:pPr algn="ctr">
+              <a:lnSpc>
+                <a:spcPts val="4479"/>
+              </a:lnSpc>
+              <a:spcBef>
+                <a:spcPct val="0"/>
+              </a:spcBef>
+            </a:pPr>
+            <a:r>
+              <a:rPr lang="en-US" sz="3199" b="1" spc="-63" dirty="0">
+                <a:solidFill>
+                  <a:srgbClr val="F7F7F7"/>
+                </a:solidFill>
+                <a:latin typeface="Arial Bold"/>
+                <a:ea typeface="Arial Bold"/>
+                <a:cs typeface="Arial Bold"/>
+                <a:sym typeface="Arial Bold"/>
+              </a:rPr>
+              <a:t>Win logic</a:t>
+            </a:r>
+            <a:endParaRPr lang="en-US" sz="3199" b="1" spc="-63" dirty="0">
+              <a:solidFill>
+                <a:srgbClr val="F7F7F7"/>
+              </a:solidFill>
+              <a:latin typeface="Consolas" panose="020B0609020204030204" pitchFamily="49" charset="0"/>
+              <a:ea typeface="Arial Bold"/>
+              <a:cs typeface="Arial Bold"/>
+              <a:sym typeface="Arial Bold"/>
+            </a:endParaRPr>
           </a:p>
         </p:txBody>
       </p:sp>
@@ -7615,15 +8313,15 @@
         </p:nvSpPr>
         <p:spPr>
           <a:xfrm>
-            <a:off x="6953461" y="3744421"/>
-            <a:ext cx="4381078" cy="1728470"/>
+            <a:off x="6944045" y="3941438"/>
+            <a:ext cx="4770453" cy="3411640"/>
           </a:xfrm>
           <a:prstGeom prst="rect">
             <a:avLst/>
           </a:prstGeom>
         </p:spPr>
         <p:txBody>
-          <a:bodyPr lIns="0" tIns="0" rIns="0" bIns="0" rtlCol="0" anchor="t">
+          <a:bodyPr wrap="square" lIns="0" tIns="0" rIns="0" bIns="0" rtlCol="0" anchor="t">
             <a:spAutoFit/>
           </a:bodyPr>
           <a:lstStyle/>
@@ -7637,7 +8335,7 @@
               </a:spcBef>
             </a:pPr>
             <a:r>
-              <a:rPr lang="en-US" sz="3199" b="1" spc="-63">
+              <a:rPr lang="en-US" sz="3199" b="1" spc="-63" dirty="0">
                 <a:solidFill>
                   <a:srgbClr val="F7F7F7"/>
                 </a:solidFill>
@@ -7646,7 +8344,354 @@
                 <a:cs typeface="Arial Bold"/>
                 <a:sym typeface="Arial Bold"/>
               </a:rPr>
-              <a:t>Replay support without memory leak or crashing</a:t>
+              <a:t>Inefficient RNG Seeding</a:t>
+            </a:r>
+          </a:p>
+          <a:p>
+            <a:pPr algn="ctr">
+              <a:lnSpc>
+                <a:spcPts val="4479"/>
+              </a:lnSpc>
+              <a:spcBef>
+                <a:spcPct val="0"/>
+              </a:spcBef>
+            </a:pPr>
+            <a:endParaRPr lang="en-US" sz="3199" b="1" spc="-63" dirty="0">
+              <a:solidFill>
+                <a:srgbClr val="F7F7F7"/>
+              </a:solidFill>
+              <a:latin typeface="Arial Bold"/>
+              <a:ea typeface="Arial Bold"/>
+              <a:cs typeface="Arial Bold"/>
+              <a:sym typeface="Arial Bold"/>
+            </a:endParaRPr>
+          </a:p>
+          <a:p>
+            <a:pPr algn="ctr">
+              <a:lnSpc>
+                <a:spcPts val="4479"/>
+              </a:lnSpc>
+              <a:spcBef>
+                <a:spcPct val="0"/>
+              </a:spcBef>
+            </a:pPr>
+            <a:r>
+              <a:rPr lang="en-US" sz="3199" b="1" spc="-63" dirty="0">
+                <a:solidFill>
+                  <a:srgbClr val="F7F7F7"/>
+                </a:solidFill>
+                <a:latin typeface="Arial Bold"/>
+                <a:ea typeface="Arial Bold"/>
+                <a:cs typeface="Arial Bold"/>
+                <a:sym typeface="Arial Bold"/>
+              </a:rPr>
+              <a:t>Moved </a:t>
+            </a:r>
+            <a:r>
+              <a:rPr lang="en-US" sz="3199" b="1" spc="-63" dirty="0" err="1">
+                <a:solidFill>
+                  <a:srgbClr val="F7F7F7"/>
+                </a:solidFill>
+                <a:latin typeface="Consolas" panose="020B0609020204030204" pitchFamily="49" charset="0"/>
+                <a:ea typeface="Arial Bold"/>
+                <a:cs typeface="Arial Bold"/>
+                <a:sym typeface="Arial Bold"/>
+              </a:rPr>
+              <a:t>srand</a:t>
+            </a:r>
+            <a:r>
+              <a:rPr lang="en-US" sz="3199" b="1" spc="-63" dirty="0">
+                <a:solidFill>
+                  <a:srgbClr val="F7F7F7"/>
+                </a:solidFill>
+                <a:latin typeface="Consolas" panose="020B0609020204030204" pitchFamily="49" charset="0"/>
+                <a:ea typeface="Arial Bold"/>
+                <a:cs typeface="Arial Bold"/>
+                <a:sym typeface="Arial Bold"/>
+              </a:rPr>
+              <a:t>(time(NULL)) </a:t>
+            </a:r>
+            <a:r>
+              <a:rPr lang="en-US" sz="3199" b="1" spc="-63" dirty="0">
+                <a:solidFill>
+                  <a:srgbClr val="F7F7F7"/>
+                </a:solidFill>
+                <a:latin typeface="Arial Bold"/>
+                <a:ea typeface="Arial Bold"/>
+                <a:cs typeface="Arial Bold"/>
+                <a:sym typeface="Arial Bold"/>
+              </a:rPr>
+              <a:t>to </a:t>
+            </a:r>
+            <a:r>
+              <a:rPr lang="en-US" sz="3199" b="1" spc="-63" dirty="0">
+                <a:solidFill>
+                  <a:srgbClr val="F7F7F7"/>
+                </a:solidFill>
+                <a:latin typeface="Consolas" panose="020B0609020204030204" pitchFamily="49" charset="0"/>
+                <a:ea typeface="Arial Bold"/>
+                <a:cs typeface="Arial Bold"/>
+                <a:sym typeface="Arial Bold"/>
+              </a:rPr>
+              <a:t>main() </a:t>
+            </a:r>
+            <a:r>
+              <a:rPr lang="en-US" sz="3199" b="1" spc="-63" dirty="0">
+                <a:solidFill>
+                  <a:srgbClr val="F7F7F7"/>
+                </a:solidFill>
+                <a:latin typeface="Arial Bold"/>
+                <a:ea typeface="Arial Bold"/>
+                <a:cs typeface="Arial Bold"/>
+                <a:sym typeface="Arial Bold"/>
+              </a:rPr>
+              <a:t>for single initialization</a:t>
+            </a:r>
+          </a:p>
+        </p:txBody>
+      </p:sp>
+      <p:sp>
+        <p:nvSpPr>
+          <p:cNvPr id="2" name="TextBox 1">
+            <a:extLst>
+              <a:ext uri="{FF2B5EF4-FFF2-40B4-BE49-F238E27FC236}">
+                <a16:creationId xmlns:a16="http://schemas.microsoft.com/office/drawing/2014/main" id="{BBCD67E1-A09B-89E1-2982-09DCA59C5AF3}"/>
+              </a:ext>
+            </a:extLst>
+          </p:cNvPr>
+          <p:cNvSpPr txBox="1"/>
+          <p:nvPr/>
+        </p:nvSpPr>
+        <p:spPr>
+          <a:xfrm>
+            <a:off x="3507083" y="3206703"/>
+            <a:ext cx="1008609" cy="307777"/>
+          </a:xfrm>
+          <a:prstGeom prst="rect">
+            <a:avLst/>
+          </a:prstGeom>
+          <a:noFill/>
+        </p:spPr>
+        <p:txBody>
+          <a:bodyPr wrap="none" rtlCol="0">
+            <a:spAutoFit/>
+          </a:bodyPr>
+          <a:lstStyle/>
+          <a:p>
+            <a:r>
+              <a:rPr lang="en-US" sz="1400" b="1" dirty="0">
+                <a:solidFill>
+                  <a:schemeClr val="bg1"/>
+                </a:solidFill>
+                <a:latin typeface="Arial Bold"/>
+                <a:cs typeface="Arial Bold"/>
+              </a:rPr>
+              <a:t>challenge</a:t>
+            </a:r>
+          </a:p>
+        </p:txBody>
+      </p:sp>
+      <p:sp>
+        <p:nvSpPr>
+          <p:cNvPr id="3" name="TextBox 2">
+            <a:extLst>
+              <a:ext uri="{FF2B5EF4-FFF2-40B4-BE49-F238E27FC236}">
+                <a16:creationId xmlns:a16="http://schemas.microsoft.com/office/drawing/2014/main" id="{70B8191E-A8CB-981B-E2B6-18F425E3A21C}"/>
+              </a:ext>
+            </a:extLst>
+          </p:cNvPr>
+          <p:cNvSpPr txBox="1"/>
+          <p:nvPr/>
+        </p:nvSpPr>
+        <p:spPr>
+          <a:xfrm>
+            <a:off x="8824966" y="3206703"/>
+            <a:ext cx="1008609" cy="307777"/>
+          </a:xfrm>
+          <a:prstGeom prst="rect">
+            <a:avLst/>
+          </a:prstGeom>
+          <a:noFill/>
+        </p:spPr>
+        <p:txBody>
+          <a:bodyPr wrap="none" rtlCol="0">
+            <a:spAutoFit/>
+          </a:bodyPr>
+          <a:lstStyle/>
+          <a:p>
+            <a:r>
+              <a:rPr lang="en-US" sz="1400" b="1" dirty="0">
+                <a:solidFill>
+                  <a:schemeClr val="bg1"/>
+                </a:solidFill>
+                <a:latin typeface="Arial Bold"/>
+                <a:cs typeface="Arial Bold"/>
+              </a:rPr>
+              <a:t>challenge</a:t>
+            </a:r>
+          </a:p>
+        </p:txBody>
+      </p:sp>
+      <p:sp>
+        <p:nvSpPr>
+          <p:cNvPr id="4" name="TextBox 3">
+            <a:extLst>
+              <a:ext uri="{FF2B5EF4-FFF2-40B4-BE49-F238E27FC236}">
+                <a16:creationId xmlns:a16="http://schemas.microsoft.com/office/drawing/2014/main" id="{33B1578F-153C-8808-C5C5-BDF10547B9FC}"/>
+              </a:ext>
+            </a:extLst>
+          </p:cNvPr>
+          <p:cNvSpPr txBox="1"/>
+          <p:nvPr/>
+        </p:nvSpPr>
+        <p:spPr>
+          <a:xfrm>
+            <a:off x="14088323" y="3206703"/>
+            <a:ext cx="1008609" cy="307777"/>
+          </a:xfrm>
+          <a:prstGeom prst="rect">
+            <a:avLst/>
+          </a:prstGeom>
+          <a:noFill/>
+        </p:spPr>
+        <p:txBody>
+          <a:bodyPr wrap="none" rtlCol="0">
+            <a:spAutoFit/>
+          </a:bodyPr>
+          <a:lstStyle/>
+          <a:p>
+            <a:r>
+              <a:rPr lang="en-US" sz="1400" b="1" dirty="0">
+                <a:solidFill>
+                  <a:schemeClr val="bg1"/>
+                </a:solidFill>
+                <a:latin typeface="Arial Bold"/>
+                <a:cs typeface="Arial Bold"/>
+              </a:rPr>
+              <a:t>challenge</a:t>
+            </a:r>
+          </a:p>
+        </p:txBody>
+      </p:sp>
+      <p:sp>
+        <p:nvSpPr>
+          <p:cNvPr id="21" name="TextBox 20">
+            <a:extLst>
+              <a:ext uri="{FF2B5EF4-FFF2-40B4-BE49-F238E27FC236}">
+                <a16:creationId xmlns:a16="http://schemas.microsoft.com/office/drawing/2014/main" id="{1F7B3657-F8B8-E04B-98E6-AAD2539E1CC7}"/>
+              </a:ext>
+            </a:extLst>
+          </p:cNvPr>
+          <p:cNvSpPr txBox="1"/>
+          <p:nvPr/>
+        </p:nvSpPr>
+        <p:spPr>
+          <a:xfrm>
+            <a:off x="1853442" y="4835723"/>
+            <a:ext cx="899605" cy="307777"/>
+          </a:xfrm>
+          <a:prstGeom prst="rect">
+            <a:avLst/>
+          </a:prstGeom>
+          <a:noFill/>
+        </p:spPr>
+        <p:txBody>
+          <a:bodyPr wrap="none" rtlCol="0">
+            <a:spAutoFit/>
+          </a:bodyPr>
+          <a:lstStyle/>
+          <a:p>
+            <a:r>
+              <a:rPr lang="en-US" sz="1400" b="1" dirty="0">
+                <a:solidFill>
+                  <a:schemeClr val="bg1"/>
+                </a:solidFill>
+                <a:latin typeface="Arial Bold"/>
+                <a:cs typeface="Arial Bold"/>
+              </a:rPr>
+              <a:t>Solution</a:t>
+            </a:r>
+          </a:p>
+        </p:txBody>
+      </p:sp>
+      <p:sp>
+        <p:nvSpPr>
+          <p:cNvPr id="22" name="TextBox 21">
+            <a:extLst>
+              <a:ext uri="{FF2B5EF4-FFF2-40B4-BE49-F238E27FC236}">
+                <a16:creationId xmlns:a16="http://schemas.microsoft.com/office/drawing/2014/main" id="{7226BA77-1FAE-3D33-3428-9EAAAFBBEE92}"/>
+              </a:ext>
+            </a:extLst>
+          </p:cNvPr>
+          <p:cNvSpPr txBox="1"/>
+          <p:nvPr/>
+        </p:nvSpPr>
+        <p:spPr>
+          <a:xfrm>
+            <a:off x="7162800" y="4835723"/>
+            <a:ext cx="899605" cy="307777"/>
+          </a:xfrm>
+          <a:prstGeom prst="rect">
+            <a:avLst/>
+          </a:prstGeom>
+          <a:noFill/>
+        </p:spPr>
+        <p:txBody>
+          <a:bodyPr wrap="none" rtlCol="0">
+            <a:spAutoFit/>
+          </a:bodyPr>
+          <a:lstStyle/>
+          <a:p>
+            <a:r>
+              <a:rPr lang="en-US" sz="1400" b="1" dirty="0">
+                <a:solidFill>
+                  <a:schemeClr val="bg1"/>
+                </a:solidFill>
+                <a:latin typeface="Arial Bold"/>
+                <a:cs typeface="Arial Bold"/>
+              </a:rPr>
+              <a:t>Solution</a:t>
+            </a:r>
+          </a:p>
+        </p:txBody>
+      </p:sp>
+      <p:sp>
+        <p:nvSpPr>
+          <p:cNvPr id="23" name="TextBox 22">
+            <a:extLst>
+              <a:ext uri="{FF2B5EF4-FFF2-40B4-BE49-F238E27FC236}">
+                <a16:creationId xmlns:a16="http://schemas.microsoft.com/office/drawing/2014/main" id="{8A64881D-04EF-1C41-3277-0969EEB17515}"/>
+              </a:ext>
+            </a:extLst>
+          </p:cNvPr>
+          <p:cNvSpPr txBox="1"/>
+          <p:nvPr/>
+        </p:nvSpPr>
+        <p:spPr>
+          <a:xfrm>
+            <a:off x="12296187" y="4840841"/>
+            <a:ext cx="899605" cy="307777"/>
+          </a:xfrm>
+          <a:prstGeom prst="rect">
+            <a:avLst/>
+          </a:prstGeom>
+          <a:noFill/>
+        </p:spPr>
+        <p:txBody>
+          <a:bodyPr wrap="none" rtlCol="0">
+            <a:spAutoFit/>
+          </a:bodyPr>
+          <a:lstStyle/>
+          <a:p>
+            <a:r>
+              <a:rPr lang="en-US" sz="1400" b="1" dirty="0">
+                <a:solidFill>
+                  <a:schemeClr val="bg1"/>
+                </a:solidFill>
+                <a:latin typeface="Arial Bold"/>
+                <a:cs typeface="Arial Bold"/>
+              </a:rPr>
+              <a:t>Solution</a:t>
             </a:r>
           </a:p>
         </p:txBody>
@@ -8001,8 +9046,8 @@
         </p:nvSpPr>
         <p:spPr>
           <a:xfrm rot="-316424">
-            <a:off x="9216891" y="6598107"/>
-            <a:ext cx="5880619" cy="537525"/>
+            <a:off x="9216891" y="6653894"/>
+            <a:ext cx="5880619" cy="425950"/>
           </a:xfrm>
           <a:prstGeom prst="rect">
             <a:avLst/>
@@ -8029,7 +9074,7 @@
                 <a:cs typeface="Arial Bold"/>
                 <a:sym typeface="Arial Bold"/>
               </a:rPr>
-              <a:t>CSE115.4 | Group 4</a:t>
+              <a:t>CSE115.4 | Group 2</a:t>
             </a:r>
           </a:p>
         </p:txBody>

</xml_diff>